<commit_message>
added professional skills portfolio semester 2
</commit_message>
<xml_diff>
--- a/Professional Skills/Presentation/Portfolio Presentation Corodeanu David Cristian.pptx
+++ b/Professional Skills/Presentation/Portfolio Presentation Corodeanu David Cristian.pptx
@@ -3372,7 +3372,7 @@
           <a:p>
             <a:fld id="{9D8190EA-5EEC-4300-B6AE-D9734C6C648E}" type="datetimeFigureOut">
               <a:rPr lang="en-US" smtClean="0"/>
-              <a:t>1/14/2025</a:t>
+              <a:t>6/9/2025</a:t>
             </a:fld>
             <a:endParaRPr lang="en-US" dirty="0"/>
           </a:p>
@@ -3549,7 +3549,7 @@
           <a:p>
             <a:fld id="{7487ADD9-2083-264C-A652-8D52D02F7E72}" type="datetimeFigureOut">
               <a:rPr lang="en-US" smtClean="0"/>
-              <a:t>1/14/2025</a:t>
+              <a:t>6/9/2025</a:t>
             </a:fld>
             <a:endParaRPr lang="en-US" dirty="0"/>
           </a:p>
@@ -12764,25 +12764,32 @@
           <a:p>
             <a:r>
               <a:rPr lang="en-US" dirty="0"/>
-              <a:t>You have gained some insight into who I am.</a:t>
+              <a:t>You have gained more insight into who I am.</a:t>
             </a:r>
           </a:p>
           <a:p>
             <a:r>
               <a:rPr lang="en-US" dirty="0"/>
-              <a:t>This has been an eventful University Semester.</a:t>
+              <a:t>This has been a year packed with interesting experiences and I have greatly developed both my technical and professional skills.</a:t>
             </a:r>
           </a:p>
           <a:p>
             <a:r>
               <a:rPr lang="en-US" dirty="0"/>
-              <a:t>This Portfolio shows some of my biggest accomplishments this year(2024).</a:t>
+              <a:t>This Portfolio shows some of my biggest accomplishments in</a:t>
+            </a:r>
+            <a:br>
+              <a:rPr lang="en-US" dirty="0"/>
+            </a:br>
+            <a:r>
+              <a:rPr lang="en-US" dirty="0"/>
+              <a:t>this scholar year(2024-2025).</a:t>
             </a:r>
           </a:p>
           <a:p>
             <a:r>
               <a:rPr lang="en-US" dirty="0"/>
-              <a:t>Looking forward for the future!</a:t>
+              <a:t>Looking forward for the future (vacation)!</a:t>
             </a:r>
           </a:p>
           <a:p>
@@ -13724,15 +13731,6 @@
 </file>
 
 <file path=customXml/item1.xml><?xml version="1.0" encoding="utf-8"?>
-<?mso-contentType ?>
-<FormTemplates xmlns="http://schemas.microsoft.com/sharepoint/v3/contenttype/forms">
-  <Display>DocumentLibraryForm</Display>
-  <Edit>DocumentLibraryForm</Edit>
-  <New>DocumentLibraryForm</New>
-</FormTemplates>
-</file>
-
-<file path=customXml/item2.xml><?xml version="1.0" encoding="utf-8"?>
 <p:properties xmlns:p="http://schemas.microsoft.com/office/2006/metadata/properties" xmlns:xsi="http://www.w3.org/2001/XMLSchema-instance" xmlns:pc="http://schemas.microsoft.com/office/infopath/2007/PartnerControls">
   <documentManagement>
     <_ip_UnifiedCompliancePolicyUIAction xmlns="http://schemas.microsoft.com/sharepoint/v3" xsi:nil="true"/>
@@ -13750,6 +13748,15 @@
     <MediaServiceKeyPoints xmlns="71af3243-3dd4-4a8d-8c0d-dd76da1f02a5" xsi:nil="true"/>
   </documentManagement>
 </p:properties>
+</file>
+
+<file path=customXml/item2.xml><?xml version="1.0" encoding="utf-8"?>
+<?mso-contentType ?>
+<FormTemplates xmlns="http://schemas.microsoft.com/sharepoint/v3/contenttype/forms">
+  <Display>DocumentLibraryForm</Display>
+  <Edit>DocumentLibraryForm</Edit>
+  <New>DocumentLibraryForm</New>
+</FormTemplates>
 </file>
 
 <file path=customXml/item3.xml><?xml version="1.0" encoding="utf-8"?>
@@ -14065,14 +14072,6 @@
 </file>
 
 <file path=customXml/itemProps1.xml><?xml version="1.0" encoding="utf-8"?>
-<ds:datastoreItem xmlns:ds="http://schemas.openxmlformats.org/officeDocument/2006/customXml" ds:itemID="{45A8381C-73EB-48EA-B45F-7B7C8C7DF409}">
-  <ds:schemaRefs>
-    <ds:schemaRef ds:uri="http://schemas.microsoft.com/sharepoint/v3/contenttype/forms"/>
-  </ds:schemaRefs>
-</ds:datastoreItem>
-</file>
-
-<file path=customXml/itemProps2.xml><?xml version="1.0" encoding="utf-8"?>
 <ds:datastoreItem xmlns:ds="http://schemas.openxmlformats.org/officeDocument/2006/customXml" ds:itemID="{61E98C35-9ECE-4425-BCBA-00E118C705CE}">
   <ds:schemaRefs>
     <ds:schemaRef ds:uri="http://schemas.microsoft.com/office/2006/metadata/properties"/>
@@ -14080,6 +14079,14 @@
     <ds:schemaRef ds:uri="http://schemas.microsoft.com/sharepoint/v3"/>
     <ds:schemaRef ds:uri="71af3243-3dd4-4a8d-8c0d-dd76da1f02a5"/>
     <ds:schemaRef ds:uri="230e9df3-be65-4c73-a93b-d1236ebd677e"/>
+  </ds:schemaRefs>
+</ds:datastoreItem>
+</file>
+
+<file path=customXml/itemProps2.xml><?xml version="1.0" encoding="utf-8"?>
+<ds:datastoreItem xmlns:ds="http://schemas.openxmlformats.org/officeDocument/2006/customXml" ds:itemID="{45A8381C-73EB-48EA-B45F-7B7C8C7DF409}">
+  <ds:schemaRefs>
+    <ds:schemaRef ds:uri="http://schemas.microsoft.com/sharepoint/v3/contenttype/forms"/>
   </ds:schemaRefs>
 </ds:datastoreItem>
 </file>

</xml_diff>